<commit_message>
Deployed  with MkDocs version: 1.6.1
</commit_message>
<xml_diff>
--- a/d4SU.pptx
+++ b/d4SU.pptx
@@ -8,6 +8,7 @@
     <p:sldId id="256" r:id="rId2"/>
     <p:sldId id="257" r:id="rId3"/>
     <p:sldId id="258" r:id="rId4"/>
+    <p:sldId id="259" r:id="rId5"/>
   </p:sldIdLst>
   <p:sldSz cx="12192000" cy="6858000"/>
   <p:notesSz cx="6858000" cy="9144000"/>
@@ -2461,7 +2462,7 @@
           <a:p>
             <a:fld id="{3C04E684-10F4-4CC3-A0B9-F03AA7BE37CF}" type="datetimeFigureOut">
               <a:rPr lang="en-US" smtClean="0"/>
-              <a:t>12/16/24</a:t>
+              <a:t>1/21/25</a:t>
             </a:fld>
             <a:endParaRPr lang="en-US"/>
           </a:p>
@@ -4951,7 +4952,7 @@
           <a:p>
             <a:fld id="{3C04E684-10F4-4CC3-A0B9-F03AA7BE37CF}" type="datetimeFigureOut">
               <a:rPr lang="en-US" smtClean="0"/>
-              <a:t>12/16/24</a:t>
+              <a:t>1/21/25</a:t>
             </a:fld>
             <a:endParaRPr lang="en-US"/>
           </a:p>
@@ -5149,7 +5150,7 @@
           <a:p>
             <a:fld id="{3C04E684-10F4-4CC3-A0B9-F03AA7BE37CF}" type="datetimeFigureOut">
               <a:rPr lang="en-US" smtClean="0"/>
-              <a:t>12/16/24</a:t>
+              <a:t>1/21/25</a:t>
             </a:fld>
             <a:endParaRPr lang="en-US"/>
           </a:p>
@@ -5357,7 +5358,7 @@
           <a:p>
             <a:fld id="{3C04E684-10F4-4CC3-A0B9-F03AA7BE37CF}" type="datetimeFigureOut">
               <a:rPr lang="en-US" smtClean="0"/>
-              <a:t>12/16/24</a:t>
+              <a:t>1/21/25</a:t>
             </a:fld>
             <a:endParaRPr lang="en-US"/>
           </a:p>
@@ -6094,7 +6095,7 @@
           <a:p>
             <a:fld id="{3C04E684-10F4-4CC3-A0B9-F03AA7BE37CF}" type="datetimeFigureOut">
               <a:rPr lang="en-US" smtClean="0"/>
-              <a:t>12/16/24</a:t>
+              <a:t>1/21/25</a:t>
             </a:fld>
             <a:endParaRPr lang="en-US"/>
           </a:p>
@@ -6736,7 +6737,7 @@
           <a:p>
             <a:fld id="{3C04E684-10F4-4CC3-A0B9-F03AA7BE37CF}" type="datetimeFigureOut">
               <a:rPr lang="en-US" smtClean="0"/>
-              <a:t>12/16/24</a:t>
+              <a:t>1/21/25</a:t>
             </a:fld>
             <a:endParaRPr lang="en-US"/>
           </a:p>
@@ -7536,7 +7537,7 @@
           <a:p>
             <a:fld id="{3C04E684-10F4-4CC3-A0B9-F03AA7BE37CF}" type="datetimeFigureOut">
               <a:rPr lang="en-US" smtClean="0"/>
-              <a:t>12/16/24</a:t>
+              <a:t>1/21/25</a:t>
             </a:fld>
             <a:endParaRPr lang="en-US"/>
           </a:p>
@@ -8487,7 +8488,7 @@
           <a:p>
             <a:fld id="{3C04E684-10F4-4CC3-A0B9-F03AA7BE37CF}" type="datetimeFigureOut">
               <a:rPr lang="en-US" smtClean="0"/>
-              <a:t>12/16/24</a:t>
+              <a:t>1/21/25</a:t>
             </a:fld>
             <a:endParaRPr lang="en-US"/>
           </a:p>
@@ -10836,7 +10837,7 @@
           <a:p>
             <a:fld id="{3C04E684-10F4-4CC3-A0B9-F03AA7BE37CF}" type="datetimeFigureOut">
               <a:rPr lang="en-US" smtClean="0"/>
-              <a:t>12/16/24</a:t>
+              <a:t>1/21/25</a:t>
             </a:fld>
             <a:endParaRPr lang="en-US"/>
           </a:p>
@@ -10949,7 +10950,7 @@
           <a:p>
             <a:fld id="{3C04E684-10F4-4CC3-A0B9-F03AA7BE37CF}" type="datetimeFigureOut">
               <a:rPr lang="en-US" smtClean="0"/>
-              <a:t>12/16/24</a:t>
+              <a:t>1/21/25</a:t>
             </a:fld>
             <a:endParaRPr lang="en-US"/>
           </a:p>
@@ -11456,7 +11457,7 @@
           <a:p>
             <a:fld id="{3C04E684-10F4-4CC3-A0B9-F03AA7BE37CF}" type="datetimeFigureOut">
               <a:rPr lang="en-US" smtClean="0"/>
-              <a:t>12/16/24</a:t>
+              <a:t>1/21/25</a:t>
             </a:fld>
             <a:endParaRPr lang="en-US"/>
           </a:p>
@@ -12759,7 +12760,7 @@
           <a:p>
             <a:fld id="{3C04E684-10F4-4CC3-A0B9-F03AA7BE37CF}" type="datetimeFigureOut">
               <a:rPr lang="en-US" smtClean="0"/>
-              <a:t>12/16/24</a:t>
+              <a:t>1/21/25</a:t>
             </a:fld>
             <a:endParaRPr lang="en-US"/>
           </a:p>
@@ -13006,7 +13007,7 @@
           <a:p>
             <a:fld id="{3C04E684-10F4-4CC3-A0B9-F03AA7BE37CF}" type="datetimeFigureOut">
               <a:rPr lang="en-US" smtClean="0"/>
-              <a:t>12/16/24</a:t>
+              <a:t>1/21/25</a:t>
             </a:fld>
             <a:endParaRPr lang="en-US"/>
           </a:p>
@@ -13506,8 +13507,8 @@
         </p:nvSpPr>
         <p:spPr>
           <a:xfrm>
-            <a:off x="2640276" y="1754567"/>
-            <a:ext cx="6915498" cy="457445"/>
+            <a:off x="2640276" y="1517067"/>
+            <a:ext cx="6915498" cy="648518"/>
           </a:xfrm>
           <a:prstGeom prst="roundRect">
             <a:avLst>
@@ -13580,7 +13581,7 @@
         </p:nvSpPr>
         <p:spPr>
           <a:xfrm>
-            <a:off x="424388" y="445878"/>
+            <a:off x="424388" y="208378"/>
             <a:ext cx="1813578" cy="1000379"/>
           </a:xfrm>
           <a:prstGeom prst="roundRect">
@@ -13644,7 +13645,7 @@
         </p:nvSpPr>
         <p:spPr>
           <a:xfrm>
-            <a:off x="2327982" y="445878"/>
+            <a:off x="2327982" y="208378"/>
             <a:ext cx="1813578" cy="1000379"/>
           </a:xfrm>
           <a:prstGeom prst="roundRect">
@@ -13703,7 +13704,7 @@
         </p:nvSpPr>
         <p:spPr>
           <a:xfrm>
-            <a:off x="4240812" y="445878"/>
+            <a:off x="4240812" y="208378"/>
             <a:ext cx="1813578" cy="1000379"/>
           </a:xfrm>
           <a:prstGeom prst="roundRect">
@@ -13765,8 +13766,8 @@
         </p:nvSpPr>
         <p:spPr>
           <a:xfrm>
-            <a:off x="2648157" y="2343293"/>
-            <a:ext cx="6915498" cy="4339305"/>
+            <a:off x="2688532" y="2418495"/>
+            <a:ext cx="6915498" cy="4196062"/>
           </a:xfrm>
           <a:prstGeom prst="roundRect">
             <a:avLst>
@@ -13828,7 +13829,7 @@
         </p:nvSpPr>
         <p:spPr>
           <a:xfrm>
-            <a:off x="9908556" y="445878"/>
+            <a:off x="9908556" y="208378"/>
             <a:ext cx="1813578" cy="1000379"/>
           </a:xfrm>
           <a:prstGeom prst="roundRect">
@@ -14006,7 +14007,7 @@
         </p:blipFill>
         <p:spPr bwMode="auto">
           <a:xfrm>
-            <a:off x="5098390" y="2418494"/>
+            <a:off x="5098390" y="2442244"/>
             <a:ext cx="1512025" cy="1444130"/>
           </a:xfrm>
           <a:prstGeom prst="rect">
@@ -14522,7 +14523,7 @@
         </p:nvSpPr>
         <p:spPr>
           <a:xfrm>
-            <a:off x="8019308" y="445878"/>
+            <a:off x="8019308" y="208378"/>
             <a:ext cx="1813578" cy="1000379"/>
           </a:xfrm>
           <a:prstGeom prst="roundRect">
@@ -14586,7 +14587,7 @@
         </p:nvSpPr>
         <p:spPr>
           <a:xfrm>
-            <a:off x="6130060" y="445878"/>
+            <a:off x="6130060" y="208378"/>
             <a:ext cx="1813578" cy="1000379"/>
           </a:xfrm>
           <a:prstGeom prst="roundRect">
@@ -14632,6 +14633,137 @@
             <a:r>
               <a:rPr lang="en-US" sz="1200" dirty="0"/>
               <a:t>Life Cycle Analysis</a:t>
+            </a:r>
+          </a:p>
+          <a:p>
+            <a:pPr algn="ctr"/>
+            <a:endParaRPr lang="en-US" sz="1200" dirty="0"/>
+          </a:p>
+        </p:txBody>
+      </p:sp>
+      <p:sp>
+        <p:nvSpPr>
+          <p:cNvPr id="13" name="Rounded Rectangle 12">
+            <a:extLst>
+              <a:ext uri="{FF2B5EF4-FFF2-40B4-BE49-F238E27FC236}">
+                <a16:creationId xmlns:a16="http://schemas.microsoft.com/office/drawing/2014/main" id="{A2D5822C-AF21-758E-1D83-89844FB6CE24}"/>
+              </a:ext>
+            </a:extLst>
+          </p:cNvPr>
+          <p:cNvSpPr/>
+          <p:nvPr/>
+        </p:nvSpPr>
+        <p:spPr>
+          <a:xfrm>
+            <a:off x="434205" y="1340210"/>
+            <a:ext cx="1813578" cy="1000379"/>
+          </a:xfrm>
+          <a:prstGeom prst="roundRect">
+            <a:avLst/>
+          </a:prstGeom>
+          <a:solidFill>
+            <a:schemeClr val="accent6">
+              <a:lumMod val="60000"/>
+              <a:lumOff val="40000"/>
+            </a:schemeClr>
+          </a:solidFill>
+          <a:ln>
+            <a:noFill/>
+          </a:ln>
+        </p:spPr>
+        <p:style>
+          <a:lnRef idx="2">
+            <a:schemeClr val="accent1">
+              <a:shade val="15000"/>
+            </a:schemeClr>
+          </a:lnRef>
+          <a:fillRef idx="1">
+            <a:schemeClr val="accent1"/>
+          </a:fillRef>
+          <a:effectRef idx="0">
+            <a:schemeClr val="accent1"/>
+          </a:effectRef>
+          <a:fontRef idx="minor">
+            <a:schemeClr val="lt1"/>
+          </a:fontRef>
+        </p:style>
+        <p:txBody>
+          <a:bodyPr rtlCol="0" anchor="ctr"/>
+          <a:lstStyle/>
+          <a:p>
+            <a:pPr algn="ctr"/>
+            <a:r>
+              <a:rPr lang="en-US" dirty="0"/>
+              <a:t>REM</a:t>
+            </a:r>
+          </a:p>
+          <a:p>
+            <a:pPr algn="ctr"/>
+            <a:r>
+              <a:rPr lang="en-US" sz="1200" dirty="0"/>
+              <a:t>Real Estate Management</a:t>
+            </a:r>
+          </a:p>
+        </p:txBody>
+      </p:sp>
+      <p:sp>
+        <p:nvSpPr>
+          <p:cNvPr id="16" name="Rounded Rectangle 15">
+            <a:extLst>
+              <a:ext uri="{FF2B5EF4-FFF2-40B4-BE49-F238E27FC236}">
+                <a16:creationId xmlns:a16="http://schemas.microsoft.com/office/drawing/2014/main" id="{B2FB3172-1F60-D2A7-8F62-5E11C34A8ACE}"/>
+              </a:ext>
+            </a:extLst>
+          </p:cNvPr>
+          <p:cNvSpPr/>
+          <p:nvPr/>
+        </p:nvSpPr>
+        <p:spPr>
+          <a:xfrm>
+            <a:off x="9908556" y="1328606"/>
+            <a:ext cx="1813578" cy="1000379"/>
+          </a:xfrm>
+          <a:prstGeom prst="roundRect">
+            <a:avLst/>
+          </a:prstGeom>
+          <a:solidFill>
+            <a:schemeClr val="accent4"/>
+          </a:solidFill>
+          <a:ln>
+            <a:noFill/>
+          </a:ln>
+        </p:spPr>
+        <p:style>
+          <a:lnRef idx="2">
+            <a:schemeClr val="accent1">
+              <a:shade val="15000"/>
+            </a:schemeClr>
+          </a:lnRef>
+          <a:fillRef idx="1">
+            <a:schemeClr val="accent1"/>
+          </a:fillRef>
+          <a:effectRef idx="0">
+            <a:schemeClr val="accent1"/>
+          </a:effectRef>
+          <a:fontRef idx="minor">
+            <a:schemeClr val="lt1"/>
+          </a:fontRef>
+        </p:style>
+        <p:txBody>
+          <a:bodyPr rtlCol="0" anchor="ctr"/>
+          <a:lstStyle/>
+          <a:p>
+            <a:pPr algn="ctr"/>
+            <a:r>
+              <a:rPr lang="en-US" dirty="0"/>
+              <a:t>PRA</a:t>
+            </a:r>
+          </a:p>
+          <a:p>
+            <a:pPr algn="ctr"/>
+            <a:r>
+              <a:rPr lang="en-US" sz="1200" dirty="0"/>
+              <a:t>Public Revenue Administration</a:t>
             </a:r>
           </a:p>
           <a:p>
@@ -14764,6 +14896,72 @@
     <p:extLst>
       <p:ext uri="{BB962C8B-B14F-4D97-AF65-F5344CB8AC3E}">
         <p14:creationId xmlns:p14="http://schemas.microsoft.com/office/powerpoint/2010/main" val="4194226739"/>
+      </p:ext>
+    </p:extLst>
+  </p:cSld>
+  <p:clrMapOvr>
+    <a:masterClrMapping/>
+  </p:clrMapOvr>
+</p:sld>
+</file>
+
+<file path=ppt/slides/slide4.xml><?xml version="1.0" encoding="utf-8"?>
+<p:sld xmlns:a="http://schemas.openxmlformats.org/drawingml/2006/main" xmlns:r="http://schemas.openxmlformats.org/officeDocument/2006/relationships" xmlns:p="http://schemas.openxmlformats.org/presentationml/2006/main">
+  <p:cSld>
+    <p:spTree>
+      <p:nvGrpSpPr>
+        <p:cNvPr id="1" name=""/>
+        <p:cNvGrpSpPr/>
+        <p:nvPr/>
+      </p:nvGrpSpPr>
+      <p:grpSpPr>
+        <a:xfrm>
+          <a:off x="0" y="0"/>
+          <a:ext cx="0" cy="0"/>
+          <a:chOff x="0" y="0"/>
+          <a:chExt cx="0" cy="0"/>
+        </a:xfrm>
+      </p:grpSpPr>
+      <p:pic>
+        <p:nvPicPr>
+          <p:cNvPr id="4" name="Graphic 3">
+            <a:extLst>
+              <a:ext uri="{FF2B5EF4-FFF2-40B4-BE49-F238E27FC236}">
+                <a16:creationId xmlns:a16="http://schemas.microsoft.com/office/drawing/2014/main" id="{422E50FC-6132-C041-D75A-7948A7D80724}"/>
+              </a:ext>
+            </a:extLst>
+          </p:cNvPr>
+          <p:cNvPicPr>
+            <a:picLocks noChangeAspect="1"/>
+          </p:cNvPicPr>
+          <p:nvPr/>
+        </p:nvPicPr>
+        <p:blipFill>
+          <a:blip r:embed="rId2">
+            <a:extLst>
+              <a:ext uri="{96DAC541-7B7A-43D3-8B79-37D633B846F1}">
+                <asvg:svgBlip xmlns:asvg="http://schemas.microsoft.com/office/drawing/2016/SVG/main" r:embed="rId3"/>
+              </a:ext>
+            </a:extLst>
+          </a:blip>
+          <a:stretch>
+            <a:fillRect/>
+          </a:stretch>
+        </p:blipFill>
+        <p:spPr>
+          <a:xfrm>
+            <a:off x="2209800" y="1679769"/>
+            <a:ext cx="7772400" cy="4424737"/>
+          </a:xfrm>
+          <a:prstGeom prst="rect">
+            <a:avLst/>
+          </a:prstGeom>
+        </p:spPr>
+      </p:pic>
+    </p:spTree>
+    <p:extLst>
+      <p:ext uri="{BB962C8B-B14F-4D97-AF65-F5344CB8AC3E}">
+        <p14:creationId xmlns:p14="http://schemas.microsoft.com/office/powerpoint/2010/main" val="1137370362"/>
       </p:ext>
     </p:extLst>
   </p:cSld>

</xml_diff>